<commit_message>
added presentation and visio source for diagram
Updated backend database to MongoDB
</commit_message>
<xml_diff>
--- a/Docs/AgI presentation.pptx
+++ b/Docs/AgI presentation.pptx
@@ -4689,8 +4689,8 @@
     <dgm:cxn modelId="{DFF3034C-3D2A-4F25-8041-95638D80D5BC}" type="presOf" srcId="{4364D8CC-F183-4E84-9E3A-D638FFC95558}" destId="{80270666-6D47-47E1-9290-9BB0C35147B9}" srcOrd="0" destOrd="0" presId="urn:microsoft.com/office/officeart/2005/8/layout/radial5"/>
     <dgm:cxn modelId="{00359853-2827-49F4-A967-38E6A20B17C7}" srcId="{4364D8CC-F183-4E84-9E3A-D638FFC95558}" destId="{E0294EB2-E284-4B7F-A844-B4520A0E133B}" srcOrd="0" destOrd="0" parTransId="{C8869B20-6201-4328-B392-F3AC2A1C3DE8}" sibTransId="{80433B14-556F-42D9-8B21-CC42F2EE1C2C}"/>
     <dgm:cxn modelId="{EB66F7C5-55C6-4F3F-9EE7-D667AF0BFCB3}" type="presOf" srcId="{BA66ED84-F9B7-4CD8-BE49-A651C757BE29}" destId="{54FAE4C8-93A4-4EFC-B985-7276E53A14D7}" srcOrd="1" destOrd="0" presId="urn:microsoft.com/office/officeart/2005/8/layout/radial5"/>
+    <dgm:cxn modelId="{9F777DB4-33CE-4B31-98CB-C6B9446B1F84}" type="presOf" srcId="{E0294EB2-E284-4B7F-A844-B4520A0E133B}" destId="{EEA3598B-A023-497F-A0F1-FEB20D8CB6C9}" srcOrd="0" destOrd="0" presId="urn:microsoft.com/office/officeart/2005/8/layout/radial5"/>
     <dgm:cxn modelId="{EAB87015-28C1-4817-993C-1E40B7B09F37}" type="presOf" srcId="{38180FF7-8110-4441-AB82-D5C750ACB9CF}" destId="{F11D9B70-33B7-4AA5-9593-DE5A5FD81D7D}" srcOrd="0" destOrd="0" presId="urn:microsoft.com/office/officeart/2005/8/layout/radial5"/>
-    <dgm:cxn modelId="{9F777DB4-33CE-4B31-98CB-C6B9446B1F84}" type="presOf" srcId="{E0294EB2-E284-4B7F-A844-B4520A0E133B}" destId="{EEA3598B-A023-497F-A0F1-FEB20D8CB6C9}" srcOrd="0" destOrd="0" presId="urn:microsoft.com/office/officeart/2005/8/layout/radial5"/>
     <dgm:cxn modelId="{CA6275D2-683C-43BE-8EFC-1EE97BBB26DE}" type="presOf" srcId="{10F4BD45-62FD-4209-8CE3-7DFEA35BE18F}" destId="{E8326671-86BD-4F28-BBDC-1A0D3DF2B15A}" srcOrd="0" destOrd="0" presId="urn:microsoft.com/office/officeart/2005/8/layout/radial5"/>
     <dgm:cxn modelId="{6DD47D31-315D-4BD3-ABDE-97652832EA01}" type="presParOf" srcId="{80270666-6D47-47E1-9290-9BB0C35147B9}" destId="{EEA3598B-A023-497F-A0F1-FEB20D8CB6C9}" srcOrd="0" destOrd="0" presId="urn:microsoft.com/office/officeart/2005/8/layout/radial5"/>
     <dgm:cxn modelId="{F293929F-6C32-43C0-82B1-31282EA3923C}" type="presParOf" srcId="{80270666-6D47-47E1-9290-9BB0C35147B9}" destId="{6EF7124E-3F92-4A22-85D6-017F0677AE4B}" srcOrd="1" destOrd="0" presId="urn:microsoft.com/office/officeart/2005/8/layout/radial5"/>
@@ -15706,7 +15706,7 @@
           <a:p>
             <a:fld id="{BBBAD476-684B-4D31-93B5-9B6D5ACF6498}" type="datetimeFigureOut">
               <a:rPr lang="en-US" smtClean="0"/>
-              <a:t>3/2/2017</a:t>
+              <a:t>3/3/2017</a:t>
             </a:fld>
             <a:endParaRPr lang="en-US"/>
           </a:p>
@@ -15874,7 +15874,7 @@
           <a:p>
             <a:fld id="{BBBAD476-684B-4D31-93B5-9B6D5ACF6498}" type="datetimeFigureOut">
               <a:rPr lang="en-US" smtClean="0"/>
-              <a:t>3/2/2017</a:t>
+              <a:t>3/3/2017</a:t>
             </a:fld>
             <a:endParaRPr lang="en-US"/>
           </a:p>
@@ -16052,7 +16052,7 @@
           <a:p>
             <a:fld id="{BBBAD476-684B-4D31-93B5-9B6D5ACF6498}" type="datetimeFigureOut">
               <a:rPr lang="en-US" smtClean="0"/>
-              <a:t>3/2/2017</a:t>
+              <a:t>3/3/2017</a:t>
             </a:fld>
             <a:endParaRPr lang="en-US"/>
           </a:p>
@@ -16220,7 +16220,7 @@
           <a:p>
             <a:fld id="{BBBAD476-684B-4D31-93B5-9B6D5ACF6498}" type="datetimeFigureOut">
               <a:rPr lang="en-US" smtClean="0"/>
-              <a:t>3/2/2017</a:t>
+              <a:t>3/3/2017</a:t>
             </a:fld>
             <a:endParaRPr lang="en-US"/>
           </a:p>
@@ -16465,7 +16465,7 @@
           <a:p>
             <a:fld id="{BBBAD476-684B-4D31-93B5-9B6D5ACF6498}" type="datetimeFigureOut">
               <a:rPr lang="en-US" smtClean="0"/>
-              <a:t>3/2/2017</a:t>
+              <a:t>3/3/2017</a:t>
             </a:fld>
             <a:endParaRPr lang="en-US"/>
           </a:p>
@@ -16750,7 +16750,7 @@
           <a:p>
             <a:fld id="{BBBAD476-684B-4D31-93B5-9B6D5ACF6498}" type="datetimeFigureOut">
               <a:rPr lang="en-US" smtClean="0"/>
-              <a:t>3/2/2017</a:t>
+              <a:t>3/3/2017</a:t>
             </a:fld>
             <a:endParaRPr lang="en-US"/>
           </a:p>
@@ -17169,7 +17169,7 @@
           <a:p>
             <a:fld id="{BBBAD476-684B-4D31-93B5-9B6D5ACF6498}" type="datetimeFigureOut">
               <a:rPr lang="en-US" smtClean="0"/>
-              <a:t>3/2/2017</a:t>
+              <a:t>3/3/2017</a:t>
             </a:fld>
             <a:endParaRPr lang="en-US"/>
           </a:p>
@@ -17286,7 +17286,7 @@
           <a:p>
             <a:fld id="{BBBAD476-684B-4D31-93B5-9B6D5ACF6498}" type="datetimeFigureOut">
               <a:rPr lang="en-US" smtClean="0"/>
-              <a:t>3/2/2017</a:t>
+              <a:t>3/3/2017</a:t>
             </a:fld>
             <a:endParaRPr lang="en-US"/>
           </a:p>
@@ -17381,7 +17381,7 @@
           <a:p>
             <a:fld id="{BBBAD476-684B-4D31-93B5-9B6D5ACF6498}" type="datetimeFigureOut">
               <a:rPr lang="en-US" smtClean="0"/>
-              <a:t>3/2/2017</a:t>
+              <a:t>3/3/2017</a:t>
             </a:fld>
             <a:endParaRPr lang="en-US"/>
           </a:p>
@@ -17656,7 +17656,7 @@
           <a:p>
             <a:fld id="{BBBAD476-684B-4D31-93B5-9B6D5ACF6498}" type="datetimeFigureOut">
               <a:rPr lang="en-US" smtClean="0"/>
-              <a:t>3/2/2017</a:t>
+              <a:t>3/3/2017</a:t>
             </a:fld>
             <a:endParaRPr lang="en-US"/>
           </a:p>
@@ -17908,7 +17908,7 @@
           <a:p>
             <a:fld id="{BBBAD476-684B-4D31-93B5-9B6D5ACF6498}" type="datetimeFigureOut">
               <a:rPr lang="en-US" smtClean="0"/>
-              <a:t>3/2/2017</a:t>
+              <a:t>3/3/2017</a:t>
             </a:fld>
             <a:endParaRPr lang="en-US"/>
           </a:p>
@@ -18119,7 +18119,7 @@
           <a:p>
             <a:fld id="{BBBAD476-684B-4D31-93B5-9B6D5ACF6498}" type="datetimeFigureOut">
               <a:rPr lang="en-US" smtClean="0"/>
-              <a:t>3/2/2017</a:t>
+              <a:t>3/3/2017</a:t>
             </a:fld>
             <a:endParaRPr lang="en-US"/>
           </a:p>
@@ -18742,56 +18742,26 @@
       </p:sp>
       <p:pic>
         <p:nvPicPr>
-          <p:cNvPr id="3" name="Picture 2"/>
+          <p:cNvPr id="4" name="Picture 3"/>
           <p:cNvPicPr>
-            <a:picLocks noChangeAspect="1" noChangeArrowheads="1"/>
+            <a:picLocks noChangeAspect="1"/>
           </p:cNvPicPr>
           <p:nvPr/>
         </p:nvPicPr>
         <p:blipFill>
-          <a:blip r:embed="rId2">
-            <a:extLst>
-              <a:ext uri="{28A0092B-C50C-407E-A947-70E740481C1C}">
-                <a14:useLocalDpi xmlns:a14="http://schemas.microsoft.com/office/drawing/2010/main" val="0"/>
-              </a:ext>
-            </a:extLst>
-          </a:blip>
-          <a:srcRect/>
+          <a:blip r:embed="rId2"/>
           <a:stretch>
             <a:fillRect/>
           </a:stretch>
         </p:blipFill>
-        <p:spPr bwMode="auto">
+        <p:spPr>
           <a:xfrm>
-            <a:off x="1906324" y="990600"/>
-            <a:ext cx="5180276" cy="5429250"/>
+            <a:off x="1143000" y="762000"/>
+            <a:ext cx="5529816" cy="5794108"/>
           </a:xfrm>
           <a:prstGeom prst="rect">
             <a:avLst/>
           </a:prstGeom>
-          <a:noFill/>
-          <a:ln>
-            <a:noFill/>
-          </a:ln>
-          <a:extLst>
-            <a:ext uri="{909E8E84-426E-40DD-AFC4-6F175D3DCCD1}">
-              <a14:hiddenFill xmlns:a14="http://schemas.microsoft.com/office/drawing/2010/main">
-                <a:solidFill>
-                  <a:schemeClr val="accent1"/>
-                </a:solidFill>
-              </a14:hiddenFill>
-            </a:ext>
-            <a:ext uri="{91240B29-F687-4F45-9708-019B960494DF}">
-              <a14:hiddenLine xmlns:a14="http://schemas.microsoft.com/office/drawing/2010/main" w="9525">
-                <a:solidFill>
-                  <a:schemeClr val="tx1"/>
-                </a:solidFill>
-                <a:miter lim="800000"/>
-                <a:headEnd/>
-                <a:tailEnd/>
-              </a14:hiddenLine>
-            </a:ext>
-          </a:extLst>
         </p:spPr>
       </p:pic>
     </p:spTree>

</xml_diff>

<commit_message>
telegraf for PC , softlater API doc
</commit_message>
<xml_diff>
--- a/Docs/AgI presentation.pptx
+++ b/Docs/AgI presentation.pptx
@@ -9,14 +9,15 @@
     <p:sldId id="257" r:id="rId3"/>
     <p:sldId id="258" r:id="rId4"/>
     <p:sldId id="259" r:id="rId5"/>
-    <p:sldId id="267" r:id="rId6"/>
-    <p:sldId id="260" r:id="rId7"/>
-    <p:sldId id="261" r:id="rId8"/>
-    <p:sldId id="262" r:id="rId9"/>
-    <p:sldId id="263" r:id="rId10"/>
-    <p:sldId id="264" r:id="rId11"/>
-    <p:sldId id="265" r:id="rId12"/>
-    <p:sldId id="266" r:id="rId13"/>
+    <p:sldId id="268" r:id="rId6"/>
+    <p:sldId id="267" r:id="rId7"/>
+    <p:sldId id="260" r:id="rId8"/>
+    <p:sldId id="261" r:id="rId9"/>
+    <p:sldId id="262" r:id="rId10"/>
+    <p:sldId id="263" r:id="rId11"/>
+    <p:sldId id="264" r:id="rId12"/>
+    <p:sldId id="265" r:id="rId13"/>
+    <p:sldId id="266" r:id="rId14"/>
   </p:sldIdLst>
   <p:sldSz cx="9144000" cy="6858000" type="screen4x3"/>
   <p:notesSz cx="6858000" cy="9144000"/>
@@ -4689,8 +4690,8 @@
     <dgm:cxn modelId="{DFF3034C-3D2A-4F25-8041-95638D80D5BC}" type="presOf" srcId="{4364D8CC-F183-4E84-9E3A-D638FFC95558}" destId="{80270666-6D47-47E1-9290-9BB0C35147B9}" srcOrd="0" destOrd="0" presId="urn:microsoft.com/office/officeart/2005/8/layout/radial5"/>
     <dgm:cxn modelId="{00359853-2827-49F4-A967-38E6A20B17C7}" srcId="{4364D8CC-F183-4E84-9E3A-D638FFC95558}" destId="{E0294EB2-E284-4B7F-A844-B4520A0E133B}" srcOrd="0" destOrd="0" parTransId="{C8869B20-6201-4328-B392-F3AC2A1C3DE8}" sibTransId="{80433B14-556F-42D9-8B21-CC42F2EE1C2C}"/>
     <dgm:cxn modelId="{EB66F7C5-55C6-4F3F-9EE7-D667AF0BFCB3}" type="presOf" srcId="{BA66ED84-F9B7-4CD8-BE49-A651C757BE29}" destId="{54FAE4C8-93A4-4EFC-B985-7276E53A14D7}" srcOrd="1" destOrd="0" presId="urn:microsoft.com/office/officeart/2005/8/layout/radial5"/>
+    <dgm:cxn modelId="{EAB87015-28C1-4817-993C-1E40B7B09F37}" type="presOf" srcId="{38180FF7-8110-4441-AB82-D5C750ACB9CF}" destId="{F11D9B70-33B7-4AA5-9593-DE5A5FD81D7D}" srcOrd="0" destOrd="0" presId="urn:microsoft.com/office/officeart/2005/8/layout/radial5"/>
     <dgm:cxn modelId="{9F777DB4-33CE-4B31-98CB-C6B9446B1F84}" type="presOf" srcId="{E0294EB2-E284-4B7F-A844-B4520A0E133B}" destId="{EEA3598B-A023-497F-A0F1-FEB20D8CB6C9}" srcOrd="0" destOrd="0" presId="urn:microsoft.com/office/officeart/2005/8/layout/radial5"/>
-    <dgm:cxn modelId="{EAB87015-28C1-4817-993C-1E40B7B09F37}" type="presOf" srcId="{38180FF7-8110-4441-AB82-D5C750ACB9CF}" destId="{F11D9B70-33B7-4AA5-9593-DE5A5FD81D7D}" srcOrd="0" destOrd="0" presId="urn:microsoft.com/office/officeart/2005/8/layout/radial5"/>
     <dgm:cxn modelId="{CA6275D2-683C-43BE-8EFC-1EE97BBB26DE}" type="presOf" srcId="{10F4BD45-62FD-4209-8CE3-7DFEA35BE18F}" destId="{E8326671-86BD-4F28-BBDC-1A0D3DF2B15A}" srcOrd="0" destOrd="0" presId="urn:microsoft.com/office/officeart/2005/8/layout/radial5"/>
     <dgm:cxn modelId="{6DD47D31-315D-4BD3-ABDE-97652832EA01}" type="presParOf" srcId="{80270666-6D47-47E1-9290-9BB0C35147B9}" destId="{EEA3598B-A023-497F-A0F1-FEB20D8CB6C9}" srcOrd="0" destOrd="0" presId="urn:microsoft.com/office/officeart/2005/8/layout/radial5"/>
     <dgm:cxn modelId="{F293929F-6C32-43C0-82B1-31282EA3923C}" type="presParOf" srcId="{80270666-6D47-47E1-9290-9BB0C35147B9}" destId="{6EF7124E-3F92-4A22-85D6-017F0677AE4B}" srcOrd="1" destOrd="0" presId="urn:microsoft.com/office/officeart/2005/8/layout/radial5"/>
@@ -15706,7 +15707,7 @@
           <a:p>
             <a:fld id="{BBBAD476-684B-4D31-93B5-9B6D5ACF6498}" type="datetimeFigureOut">
               <a:rPr lang="en-US" smtClean="0"/>
-              <a:t>3/3/2017</a:t>
+              <a:t>3/6/2017</a:t>
             </a:fld>
             <a:endParaRPr lang="en-US"/>
           </a:p>
@@ -15874,7 +15875,7 @@
           <a:p>
             <a:fld id="{BBBAD476-684B-4D31-93B5-9B6D5ACF6498}" type="datetimeFigureOut">
               <a:rPr lang="en-US" smtClean="0"/>
-              <a:t>3/3/2017</a:t>
+              <a:t>3/6/2017</a:t>
             </a:fld>
             <a:endParaRPr lang="en-US"/>
           </a:p>
@@ -16052,7 +16053,7 @@
           <a:p>
             <a:fld id="{BBBAD476-684B-4D31-93B5-9B6D5ACF6498}" type="datetimeFigureOut">
               <a:rPr lang="en-US" smtClean="0"/>
-              <a:t>3/3/2017</a:t>
+              <a:t>3/6/2017</a:t>
             </a:fld>
             <a:endParaRPr lang="en-US"/>
           </a:p>
@@ -16220,7 +16221,7 @@
           <a:p>
             <a:fld id="{BBBAD476-684B-4D31-93B5-9B6D5ACF6498}" type="datetimeFigureOut">
               <a:rPr lang="en-US" smtClean="0"/>
-              <a:t>3/3/2017</a:t>
+              <a:t>3/6/2017</a:t>
             </a:fld>
             <a:endParaRPr lang="en-US"/>
           </a:p>
@@ -16465,7 +16466,7 @@
           <a:p>
             <a:fld id="{BBBAD476-684B-4D31-93B5-9B6D5ACF6498}" type="datetimeFigureOut">
               <a:rPr lang="en-US" smtClean="0"/>
-              <a:t>3/3/2017</a:t>
+              <a:t>3/6/2017</a:t>
             </a:fld>
             <a:endParaRPr lang="en-US"/>
           </a:p>
@@ -16750,7 +16751,7 @@
           <a:p>
             <a:fld id="{BBBAD476-684B-4D31-93B5-9B6D5ACF6498}" type="datetimeFigureOut">
               <a:rPr lang="en-US" smtClean="0"/>
-              <a:t>3/3/2017</a:t>
+              <a:t>3/6/2017</a:t>
             </a:fld>
             <a:endParaRPr lang="en-US"/>
           </a:p>
@@ -17169,7 +17170,7 @@
           <a:p>
             <a:fld id="{BBBAD476-684B-4D31-93B5-9B6D5ACF6498}" type="datetimeFigureOut">
               <a:rPr lang="en-US" smtClean="0"/>
-              <a:t>3/3/2017</a:t>
+              <a:t>3/6/2017</a:t>
             </a:fld>
             <a:endParaRPr lang="en-US"/>
           </a:p>
@@ -17286,7 +17287,7 @@
           <a:p>
             <a:fld id="{BBBAD476-684B-4D31-93B5-9B6D5ACF6498}" type="datetimeFigureOut">
               <a:rPr lang="en-US" smtClean="0"/>
-              <a:t>3/3/2017</a:t>
+              <a:t>3/6/2017</a:t>
             </a:fld>
             <a:endParaRPr lang="en-US"/>
           </a:p>
@@ -17381,7 +17382,7 @@
           <a:p>
             <a:fld id="{BBBAD476-684B-4D31-93B5-9B6D5ACF6498}" type="datetimeFigureOut">
               <a:rPr lang="en-US" smtClean="0"/>
-              <a:t>3/3/2017</a:t>
+              <a:t>3/6/2017</a:t>
             </a:fld>
             <a:endParaRPr lang="en-US"/>
           </a:p>
@@ -17656,7 +17657,7 @@
           <a:p>
             <a:fld id="{BBBAD476-684B-4D31-93B5-9B6D5ACF6498}" type="datetimeFigureOut">
               <a:rPr lang="en-US" smtClean="0"/>
-              <a:t>3/3/2017</a:t>
+              <a:t>3/6/2017</a:t>
             </a:fld>
             <a:endParaRPr lang="en-US"/>
           </a:p>
@@ -17908,7 +17909,7 @@
           <a:p>
             <a:fld id="{BBBAD476-684B-4D31-93B5-9B6D5ACF6498}" type="datetimeFigureOut">
               <a:rPr lang="en-US" smtClean="0"/>
-              <a:t>3/3/2017</a:t>
+              <a:t>3/6/2017</a:t>
             </a:fld>
             <a:endParaRPr lang="en-US"/>
           </a:p>
@@ -18119,7 +18120,7 @@
           <a:p>
             <a:fld id="{BBBAD476-684B-4D31-93B5-9B6D5ACF6498}" type="datetimeFigureOut">
               <a:rPr lang="en-US" smtClean="0"/>
-              <a:t>3/3/2017</a:t>
+              <a:t>3/6/2017</a:t>
             </a:fld>
             <a:endParaRPr lang="en-US"/>
           </a:p>
@@ -18602,6 +18603,226 @@
           <a:lstStyle/>
           <a:p>
             <a:r>
+              <a:rPr lang="en-US" dirty="0"/>
+              <a:t>Historical depth equipment Hierarchy</a:t>
+            </a:r>
+          </a:p>
+        </p:txBody>
+      </p:sp>
+      <p:pic>
+        <p:nvPicPr>
+          <p:cNvPr id="4098" name="Picture 2">
+            <a:hlinkClick r:id="rId2"/>
+          </p:cNvPr>
+          <p:cNvPicPr>
+            <a:picLocks noGrp="1" noChangeAspect="1" noChangeArrowheads="1"/>
+          </p:cNvPicPr>
+          <p:nvPr>
+            <p:ph idx="1"/>
+          </p:nvPr>
+        </p:nvPicPr>
+        <p:blipFill>
+          <a:blip r:embed="rId3">
+            <a:extLst>
+              <a:ext uri="{28A0092B-C50C-407E-A947-70E740481C1C}">
+                <a14:useLocalDpi xmlns:a14="http://schemas.microsoft.com/office/drawing/2010/main" val="0"/>
+              </a:ext>
+            </a:extLst>
+          </a:blip>
+          <a:srcRect/>
+          <a:stretch>
+            <a:fillRect/>
+          </a:stretch>
+        </p:blipFill>
+        <p:spPr bwMode="auto">
+          <a:xfrm>
+            <a:off x="1752600" y="1524000"/>
+            <a:ext cx="4355055" cy="3481179"/>
+          </a:xfrm>
+          <a:prstGeom prst="rect">
+            <a:avLst/>
+          </a:prstGeom>
+          <a:noFill/>
+          <a:ln>
+            <a:noFill/>
+          </a:ln>
+          <a:extLst>
+            <a:ext uri="{909E8E84-426E-40DD-AFC4-6F175D3DCCD1}">
+              <a14:hiddenFill xmlns:a14="http://schemas.microsoft.com/office/drawing/2010/main">
+                <a:solidFill>
+                  <a:schemeClr val="accent1"/>
+                </a:solidFill>
+              </a14:hiddenFill>
+            </a:ext>
+            <a:ext uri="{91240B29-F687-4F45-9708-019B960494DF}">
+              <a14:hiddenLine xmlns:a14="http://schemas.microsoft.com/office/drawing/2010/main" w="9525">
+                <a:solidFill>
+                  <a:schemeClr val="tx1"/>
+                </a:solidFill>
+                <a:miter lim="800000"/>
+                <a:headEnd/>
+                <a:tailEnd/>
+              </a14:hiddenLine>
+            </a:ext>
+          </a:extLst>
+        </p:spPr>
+      </p:pic>
+      <p:pic>
+        <p:nvPicPr>
+          <p:cNvPr id="5" name="Picture 3"/>
+          <p:cNvPicPr>
+            <a:picLocks noChangeAspect="1" noChangeArrowheads="1"/>
+          </p:cNvPicPr>
+          <p:nvPr/>
+        </p:nvPicPr>
+        <p:blipFill>
+          <a:blip r:embed="rId4">
+            <a:extLst>
+              <a:ext uri="{28A0092B-C50C-407E-A947-70E740481C1C}">
+                <a14:useLocalDpi xmlns:a14="http://schemas.microsoft.com/office/drawing/2010/main" val="0"/>
+              </a:ext>
+            </a:extLst>
+          </a:blip>
+          <a:srcRect/>
+          <a:stretch>
+            <a:fillRect/>
+          </a:stretch>
+        </p:blipFill>
+        <p:spPr bwMode="auto">
+          <a:xfrm rot="10800000">
+            <a:off x="1295400" y="5210175"/>
+            <a:ext cx="5591175" cy="390525"/>
+          </a:xfrm>
+          <a:prstGeom prst="rect">
+            <a:avLst/>
+          </a:prstGeom>
+          <a:noFill/>
+          <a:ln>
+            <a:noFill/>
+          </a:ln>
+          <a:extLst>
+            <a:ext uri="{909E8E84-426E-40DD-AFC4-6F175D3DCCD1}">
+              <a14:hiddenFill xmlns:a14="http://schemas.microsoft.com/office/drawing/2010/main">
+                <a:solidFill>
+                  <a:schemeClr val="accent1"/>
+                </a:solidFill>
+              </a14:hiddenFill>
+            </a:ext>
+            <a:ext uri="{91240B29-F687-4F45-9708-019B960494DF}">
+              <a14:hiddenLine xmlns:a14="http://schemas.microsoft.com/office/drawing/2010/main" w="9525">
+                <a:solidFill>
+                  <a:schemeClr val="tx1"/>
+                </a:solidFill>
+                <a:miter lim="800000"/>
+                <a:headEnd/>
+                <a:tailEnd/>
+              </a14:hiddenLine>
+            </a:ext>
+          </a:extLst>
+        </p:spPr>
+      </p:pic>
+      <p:pic>
+        <p:nvPicPr>
+          <p:cNvPr id="4099" name="Picture 3"/>
+          <p:cNvPicPr>
+            <a:picLocks noChangeAspect="1" noChangeArrowheads="1"/>
+          </p:cNvPicPr>
+          <p:nvPr/>
+        </p:nvPicPr>
+        <p:blipFill>
+          <a:blip r:embed="rId5">
+            <a:extLst>
+              <a:ext uri="{28A0092B-C50C-407E-A947-70E740481C1C}">
+                <a14:useLocalDpi xmlns:a14="http://schemas.microsoft.com/office/drawing/2010/main" val="0"/>
+              </a:ext>
+            </a:extLst>
+          </a:blip>
+          <a:srcRect/>
+          <a:stretch>
+            <a:fillRect/>
+          </a:stretch>
+        </p:blipFill>
+        <p:spPr bwMode="auto">
+          <a:xfrm>
+            <a:off x="756528" y="4953000"/>
+            <a:ext cx="6248400" cy="257175"/>
+          </a:xfrm>
+          <a:prstGeom prst="rect">
+            <a:avLst/>
+          </a:prstGeom>
+          <a:noFill/>
+          <a:ln>
+            <a:noFill/>
+          </a:ln>
+          <a:extLst>
+            <a:ext uri="{909E8E84-426E-40DD-AFC4-6F175D3DCCD1}">
+              <a14:hiddenFill xmlns:a14="http://schemas.microsoft.com/office/drawing/2010/main">
+                <a:solidFill>
+                  <a:schemeClr val="accent1"/>
+                </a:solidFill>
+              </a14:hiddenFill>
+            </a:ext>
+            <a:ext uri="{91240B29-F687-4F45-9708-019B960494DF}">
+              <a14:hiddenLine xmlns:a14="http://schemas.microsoft.com/office/drawing/2010/main" w="9525">
+                <a:solidFill>
+                  <a:schemeClr val="tx1"/>
+                </a:solidFill>
+                <a:miter lim="800000"/>
+                <a:headEnd/>
+                <a:tailEnd/>
+              </a14:hiddenLine>
+            </a:ext>
+          </a:extLst>
+        </p:spPr>
+      </p:pic>
+    </p:spTree>
+    <p:extLst>
+      <p:ext uri="{BB962C8B-B14F-4D97-AF65-F5344CB8AC3E}">
+        <p14:creationId xmlns:p14="http://schemas.microsoft.com/office/powerpoint/2010/main" val="3146743235"/>
+      </p:ext>
+    </p:extLst>
+  </p:cSld>
+  <p:clrMapOvr>
+    <a:masterClrMapping/>
+  </p:clrMapOvr>
+</p:sld>
+</file>
+
+<file path=ppt/slides/slide11.xml><?xml version="1.0" encoding="utf-8"?>
+<p:sld xmlns:a="http://schemas.openxmlformats.org/drawingml/2006/main" xmlns:r="http://schemas.openxmlformats.org/officeDocument/2006/relationships" xmlns:p="http://schemas.openxmlformats.org/presentationml/2006/main">
+  <p:cSld>
+    <p:spTree>
+      <p:nvGrpSpPr>
+        <p:cNvPr id="1" name=""/>
+        <p:cNvGrpSpPr/>
+        <p:nvPr/>
+      </p:nvGrpSpPr>
+      <p:grpSpPr>
+        <a:xfrm>
+          <a:off x="0" y="0"/>
+          <a:ext cx="0" cy="0"/>
+          <a:chOff x="0" y="0"/>
+          <a:chExt cx="0" cy="0"/>
+        </a:xfrm>
+      </p:grpSpPr>
+      <p:sp>
+        <p:nvSpPr>
+          <p:cNvPr id="2" name="Title 1"/>
+          <p:cNvSpPr>
+            <a:spLocks noGrp="1"/>
+          </p:cNvSpPr>
+          <p:nvPr>
+            <p:ph type="title"/>
+          </p:nvPr>
+        </p:nvSpPr>
+        <p:spPr/>
+        <p:txBody>
+          <a:bodyPr>
+            <a:normAutofit fontScale="90000"/>
+          </a:bodyPr>
+          <a:lstStyle/>
+          <a:p>
+            <a:r>
               <a:rPr lang="en-US" sz="4000" dirty="0"/>
               <a:t>Smooth server supported brush and zoom</a:t>
             </a:r>
@@ -18696,7 +18917,7 @@
 </p:sld>
 </file>
 
-<file path=ppt/slides/slide11.xml><?xml version="1.0" encoding="utf-8"?>
+<file path=ppt/slides/slide12.xml><?xml version="1.0" encoding="utf-8"?>
 <p:sld xmlns:a="http://schemas.openxmlformats.org/drawingml/2006/main" xmlns:r="http://schemas.openxmlformats.org/officeDocument/2006/relationships" xmlns:p="http://schemas.openxmlformats.org/presentationml/2006/main">
   <p:cSld>
     <p:spTree>
@@ -18777,7 +18998,7 @@
 </p:sld>
 </file>
 
-<file path=ppt/slides/slide12.xml><?xml version="1.0" encoding="utf-8"?>
+<file path=ppt/slides/slide13.xml><?xml version="1.0" encoding="utf-8"?>
 <p:sld xmlns:a="http://schemas.openxmlformats.org/drawingml/2006/main" xmlns:r="http://schemas.openxmlformats.org/officeDocument/2006/relationships" xmlns:p="http://schemas.openxmlformats.org/presentationml/2006/main">
   <p:cSld>
     <p:spTree>
@@ -19502,6 +19723,172 @@
           <a:chExt cx="0" cy="0"/>
         </a:xfrm>
       </p:grpSpPr>
+      <p:sp>
+        <p:nvSpPr>
+          <p:cNvPr id="2" name="Title 1"/>
+          <p:cNvSpPr>
+            <a:spLocks noGrp="1"/>
+          </p:cNvSpPr>
+          <p:nvPr>
+            <p:ph type="title"/>
+          </p:nvPr>
+        </p:nvSpPr>
+        <p:spPr/>
+        <p:txBody>
+          <a:bodyPr/>
+          <a:lstStyle/>
+          <a:p>
+            <a:r>
+              <a:rPr lang="en-US" dirty="0"/>
+              <a:t>Target Audience &amp; Usage</a:t>
+            </a:r>
+            <a:endParaRPr lang="en-US" dirty="0"/>
+          </a:p>
+        </p:txBody>
+      </p:sp>
+      <p:sp>
+        <p:nvSpPr>
+          <p:cNvPr id="3" name="Content Placeholder 2"/>
+          <p:cNvSpPr>
+            <a:spLocks noGrp="1"/>
+          </p:cNvSpPr>
+          <p:nvPr>
+            <p:ph idx="1"/>
+          </p:nvPr>
+        </p:nvSpPr>
+        <p:spPr>
+          <a:xfrm>
+            <a:off x="457200" y="1295400"/>
+            <a:ext cx="8229600" cy="4830763"/>
+          </a:xfrm>
+        </p:spPr>
+        <p:txBody>
+          <a:bodyPr/>
+          <a:lstStyle/>
+          <a:p>
+            <a:r>
+              <a:rPr lang="en-US" sz="2400" dirty="0"/>
+              <a:t>Remote Operators</a:t>
+            </a:r>
+          </a:p>
+          <a:p>
+            <a:pPr lvl="1"/>
+            <a:r>
+              <a:rPr lang="en-US" sz="1400" dirty="0"/>
+              <a:t>Respond to alerts</a:t>
+            </a:r>
+          </a:p>
+          <a:p>
+            <a:pPr lvl="1"/>
+            <a:r>
+              <a:rPr lang="en-US" sz="1400" dirty="0"/>
+              <a:t>Troubleshoot and recover from equipment failures</a:t>
+            </a:r>
+          </a:p>
+          <a:p>
+            <a:r>
+              <a:rPr lang="en-US" sz="2400" dirty="0"/>
+              <a:t>Operations Manager</a:t>
+            </a:r>
+          </a:p>
+          <a:p>
+            <a:pPr lvl="1"/>
+            <a:r>
+              <a:rPr lang="en-US" sz="1400" dirty="0"/>
+              <a:t>Monitor operators efficiency</a:t>
+            </a:r>
+          </a:p>
+          <a:p>
+            <a:pPr lvl="1"/>
+            <a:r>
+              <a:rPr lang="en-US" sz="1400" dirty="0"/>
+              <a:t>Quantify lost opportunity</a:t>
+            </a:r>
+          </a:p>
+          <a:p>
+            <a:pPr lvl="1"/>
+            <a:r>
+              <a:rPr lang="en-US" sz="1400" dirty="0"/>
+              <a:t>Preventative maintenance</a:t>
+            </a:r>
+          </a:p>
+          <a:p>
+            <a:pPr lvl="1"/>
+            <a:r>
+              <a:rPr lang="en-US" sz="1400" dirty="0"/>
+              <a:t>Handle escalated operational issues</a:t>
+            </a:r>
+          </a:p>
+          <a:p>
+            <a:r>
+              <a:rPr lang="en-US" sz="1800" dirty="0">
+                <a:solidFill>
+                  <a:schemeClr val="bg1">
+                    <a:lumMod val="65000"/>
+                  </a:schemeClr>
+                </a:solidFill>
+              </a:rPr>
+              <a:t>Market scheduler</a:t>
+            </a:r>
+          </a:p>
+          <a:p>
+            <a:pPr lvl="1"/>
+            <a:r>
+              <a:rPr lang="en-US" sz="1400" dirty="0">
+                <a:solidFill>
+                  <a:schemeClr val="bg1">
+                    <a:lumMod val="65000"/>
+                  </a:schemeClr>
+                </a:solidFill>
+              </a:rPr>
+              <a:t>Profitability</a:t>
+            </a:r>
+          </a:p>
+          <a:p>
+            <a:pPr lvl="1"/>
+            <a:r>
+              <a:rPr lang="en-US" sz="1400" dirty="0">
+                <a:solidFill>
+                  <a:schemeClr val="bg1">
+                    <a:lumMod val="65000"/>
+                  </a:schemeClr>
+                </a:solidFill>
+              </a:rPr>
+              <a:t>Response to grid operator’s instructions</a:t>
+            </a:r>
+          </a:p>
+        </p:txBody>
+      </p:sp>
+    </p:spTree>
+    <p:extLst>
+      <p:ext uri="{BB962C8B-B14F-4D97-AF65-F5344CB8AC3E}">
+        <p14:creationId xmlns:p14="http://schemas.microsoft.com/office/powerpoint/2010/main" val="2943923531"/>
+      </p:ext>
+    </p:extLst>
+  </p:cSld>
+  <p:clrMapOvr>
+    <a:masterClrMapping/>
+  </p:clrMapOvr>
+</p:sld>
+</file>
+
+<file path=ppt/slides/slide6.xml><?xml version="1.0" encoding="utf-8"?>
+<p:sld xmlns:a="http://schemas.openxmlformats.org/drawingml/2006/main" xmlns:r="http://schemas.openxmlformats.org/officeDocument/2006/relationships" xmlns:p="http://schemas.openxmlformats.org/presentationml/2006/main">
+  <p:cSld>
+    <p:spTree>
+      <p:nvGrpSpPr>
+        <p:cNvPr id="1" name=""/>
+        <p:cNvGrpSpPr/>
+        <p:nvPr/>
+      </p:nvGrpSpPr>
+      <p:grpSpPr>
+        <a:xfrm>
+          <a:off x="0" y="0"/>
+          <a:ext cx="0" cy="0"/>
+          <a:chOff x="0" y="0"/>
+          <a:chExt cx="0" cy="0"/>
+        </a:xfrm>
+      </p:grpSpPr>
       <p:pic>
         <p:nvPicPr>
           <p:cNvPr id="4" name="Content Placeholder 3"/>
@@ -19544,7 +19931,7 @@
 </p:sld>
 </file>
 
-<file path=ppt/slides/slide6.xml><?xml version="1.0" encoding="utf-8"?>
+<file path=ppt/slides/slide7.xml><?xml version="1.0" encoding="utf-8"?>
 <p:sld xmlns:a="http://schemas.openxmlformats.org/drawingml/2006/main" xmlns:r="http://schemas.openxmlformats.org/officeDocument/2006/relationships" xmlns:p="http://schemas.openxmlformats.org/presentationml/2006/main">
   <p:cSld>
     <p:spTree>
@@ -19636,7 +20023,7 @@
 </p:sld>
 </file>
 
-<file path=ppt/slides/slide7.xml><?xml version="1.0" encoding="utf-8"?>
+<file path=ppt/slides/slide8.xml><?xml version="1.0" encoding="utf-8"?>
 <p:sld xmlns:a="http://schemas.openxmlformats.org/drawingml/2006/main" xmlns:r="http://schemas.openxmlformats.org/officeDocument/2006/relationships" xmlns:p="http://schemas.openxmlformats.org/presentationml/2006/main">
   <p:cSld>
     <p:spTree>
@@ -19798,7 +20185,7 @@
 </p:sld>
 </file>
 
-<file path=ppt/slides/slide8.xml><?xml version="1.0" encoding="utf-8"?>
+<file path=ppt/slides/slide9.xml><?xml version="1.0" encoding="utf-8"?>
 <p:sld xmlns:a="http://schemas.openxmlformats.org/drawingml/2006/main" xmlns:r="http://schemas.openxmlformats.org/officeDocument/2006/relationships" xmlns:p="http://schemas.openxmlformats.org/presentationml/2006/main">
   <p:cSld>
     <p:spTree>
@@ -19899,226 +20286,6 @@
     <p:extLst>
       <p:ext uri="{BB962C8B-B14F-4D97-AF65-F5344CB8AC3E}">
         <p14:creationId xmlns:p14="http://schemas.microsoft.com/office/powerpoint/2010/main" val="1893715213"/>
-      </p:ext>
-    </p:extLst>
-  </p:cSld>
-  <p:clrMapOvr>
-    <a:masterClrMapping/>
-  </p:clrMapOvr>
-</p:sld>
-</file>
-
-<file path=ppt/slides/slide9.xml><?xml version="1.0" encoding="utf-8"?>
-<p:sld xmlns:a="http://schemas.openxmlformats.org/drawingml/2006/main" xmlns:r="http://schemas.openxmlformats.org/officeDocument/2006/relationships" xmlns:p="http://schemas.openxmlformats.org/presentationml/2006/main">
-  <p:cSld>
-    <p:spTree>
-      <p:nvGrpSpPr>
-        <p:cNvPr id="1" name=""/>
-        <p:cNvGrpSpPr/>
-        <p:nvPr/>
-      </p:nvGrpSpPr>
-      <p:grpSpPr>
-        <a:xfrm>
-          <a:off x="0" y="0"/>
-          <a:ext cx="0" cy="0"/>
-          <a:chOff x="0" y="0"/>
-          <a:chExt cx="0" cy="0"/>
-        </a:xfrm>
-      </p:grpSpPr>
-      <p:sp>
-        <p:nvSpPr>
-          <p:cNvPr id="2" name="Title 1"/>
-          <p:cNvSpPr>
-            <a:spLocks noGrp="1"/>
-          </p:cNvSpPr>
-          <p:nvPr>
-            <p:ph type="title"/>
-          </p:nvPr>
-        </p:nvSpPr>
-        <p:spPr/>
-        <p:txBody>
-          <a:bodyPr>
-            <a:normAutofit fontScale="90000"/>
-          </a:bodyPr>
-          <a:lstStyle/>
-          <a:p>
-            <a:r>
-              <a:rPr lang="en-US" dirty="0"/>
-              <a:t>Historical depth equipment Hierarchy</a:t>
-            </a:r>
-          </a:p>
-        </p:txBody>
-      </p:sp>
-      <p:pic>
-        <p:nvPicPr>
-          <p:cNvPr id="4098" name="Picture 2">
-            <a:hlinkClick r:id="rId2"/>
-          </p:cNvPr>
-          <p:cNvPicPr>
-            <a:picLocks noGrp="1" noChangeAspect="1" noChangeArrowheads="1"/>
-          </p:cNvPicPr>
-          <p:nvPr>
-            <p:ph idx="1"/>
-          </p:nvPr>
-        </p:nvPicPr>
-        <p:blipFill>
-          <a:blip r:embed="rId3">
-            <a:extLst>
-              <a:ext uri="{28A0092B-C50C-407E-A947-70E740481C1C}">
-                <a14:useLocalDpi xmlns:a14="http://schemas.microsoft.com/office/drawing/2010/main" val="0"/>
-              </a:ext>
-            </a:extLst>
-          </a:blip>
-          <a:srcRect/>
-          <a:stretch>
-            <a:fillRect/>
-          </a:stretch>
-        </p:blipFill>
-        <p:spPr bwMode="auto">
-          <a:xfrm>
-            <a:off x="1752600" y="1524000"/>
-            <a:ext cx="4355055" cy="3481179"/>
-          </a:xfrm>
-          <a:prstGeom prst="rect">
-            <a:avLst/>
-          </a:prstGeom>
-          <a:noFill/>
-          <a:ln>
-            <a:noFill/>
-          </a:ln>
-          <a:extLst>
-            <a:ext uri="{909E8E84-426E-40DD-AFC4-6F175D3DCCD1}">
-              <a14:hiddenFill xmlns:a14="http://schemas.microsoft.com/office/drawing/2010/main">
-                <a:solidFill>
-                  <a:schemeClr val="accent1"/>
-                </a:solidFill>
-              </a14:hiddenFill>
-            </a:ext>
-            <a:ext uri="{91240B29-F687-4F45-9708-019B960494DF}">
-              <a14:hiddenLine xmlns:a14="http://schemas.microsoft.com/office/drawing/2010/main" w="9525">
-                <a:solidFill>
-                  <a:schemeClr val="tx1"/>
-                </a:solidFill>
-                <a:miter lim="800000"/>
-                <a:headEnd/>
-                <a:tailEnd/>
-              </a14:hiddenLine>
-            </a:ext>
-          </a:extLst>
-        </p:spPr>
-      </p:pic>
-      <p:pic>
-        <p:nvPicPr>
-          <p:cNvPr id="5" name="Picture 3"/>
-          <p:cNvPicPr>
-            <a:picLocks noChangeAspect="1" noChangeArrowheads="1"/>
-          </p:cNvPicPr>
-          <p:nvPr/>
-        </p:nvPicPr>
-        <p:blipFill>
-          <a:blip r:embed="rId4">
-            <a:extLst>
-              <a:ext uri="{28A0092B-C50C-407E-A947-70E740481C1C}">
-                <a14:useLocalDpi xmlns:a14="http://schemas.microsoft.com/office/drawing/2010/main" val="0"/>
-              </a:ext>
-            </a:extLst>
-          </a:blip>
-          <a:srcRect/>
-          <a:stretch>
-            <a:fillRect/>
-          </a:stretch>
-        </p:blipFill>
-        <p:spPr bwMode="auto">
-          <a:xfrm rot="10800000">
-            <a:off x="1295400" y="5210175"/>
-            <a:ext cx="5591175" cy="390525"/>
-          </a:xfrm>
-          <a:prstGeom prst="rect">
-            <a:avLst/>
-          </a:prstGeom>
-          <a:noFill/>
-          <a:ln>
-            <a:noFill/>
-          </a:ln>
-          <a:extLst>
-            <a:ext uri="{909E8E84-426E-40DD-AFC4-6F175D3DCCD1}">
-              <a14:hiddenFill xmlns:a14="http://schemas.microsoft.com/office/drawing/2010/main">
-                <a:solidFill>
-                  <a:schemeClr val="accent1"/>
-                </a:solidFill>
-              </a14:hiddenFill>
-            </a:ext>
-            <a:ext uri="{91240B29-F687-4F45-9708-019B960494DF}">
-              <a14:hiddenLine xmlns:a14="http://schemas.microsoft.com/office/drawing/2010/main" w="9525">
-                <a:solidFill>
-                  <a:schemeClr val="tx1"/>
-                </a:solidFill>
-                <a:miter lim="800000"/>
-                <a:headEnd/>
-                <a:tailEnd/>
-              </a14:hiddenLine>
-            </a:ext>
-          </a:extLst>
-        </p:spPr>
-      </p:pic>
-      <p:pic>
-        <p:nvPicPr>
-          <p:cNvPr id="4099" name="Picture 3"/>
-          <p:cNvPicPr>
-            <a:picLocks noChangeAspect="1" noChangeArrowheads="1"/>
-          </p:cNvPicPr>
-          <p:nvPr/>
-        </p:nvPicPr>
-        <p:blipFill>
-          <a:blip r:embed="rId5">
-            <a:extLst>
-              <a:ext uri="{28A0092B-C50C-407E-A947-70E740481C1C}">
-                <a14:useLocalDpi xmlns:a14="http://schemas.microsoft.com/office/drawing/2010/main" val="0"/>
-              </a:ext>
-            </a:extLst>
-          </a:blip>
-          <a:srcRect/>
-          <a:stretch>
-            <a:fillRect/>
-          </a:stretch>
-        </p:blipFill>
-        <p:spPr bwMode="auto">
-          <a:xfrm>
-            <a:off x="756528" y="4953000"/>
-            <a:ext cx="6248400" cy="257175"/>
-          </a:xfrm>
-          <a:prstGeom prst="rect">
-            <a:avLst/>
-          </a:prstGeom>
-          <a:noFill/>
-          <a:ln>
-            <a:noFill/>
-          </a:ln>
-          <a:extLst>
-            <a:ext uri="{909E8E84-426E-40DD-AFC4-6F175D3DCCD1}">
-              <a14:hiddenFill xmlns:a14="http://schemas.microsoft.com/office/drawing/2010/main">
-                <a:solidFill>
-                  <a:schemeClr val="accent1"/>
-                </a:solidFill>
-              </a14:hiddenFill>
-            </a:ext>
-            <a:ext uri="{91240B29-F687-4F45-9708-019B960494DF}">
-              <a14:hiddenLine xmlns:a14="http://schemas.microsoft.com/office/drawing/2010/main" w="9525">
-                <a:solidFill>
-                  <a:schemeClr val="tx1"/>
-                </a:solidFill>
-                <a:miter lim="800000"/>
-                <a:headEnd/>
-                <a:tailEnd/>
-              </a14:hiddenLine>
-            </a:ext>
-          </a:extLst>
-        </p:spPr>
-      </p:pic>
-    </p:spTree>
-    <p:extLst>
-      <p:ext uri="{BB962C8B-B14F-4D97-AF65-F5344CB8AC3E}">
-        <p14:creationId xmlns:p14="http://schemas.microsoft.com/office/powerpoint/2010/main" val="3146743235"/>
       </p:ext>
     </p:extLst>
   </p:cSld>

</xml_diff>